<commit_message>
Update presentation based on feedback
- Change wording to make it clearer that unit testing improves
confidence when *refactoring* code
- Update image on p10 to show where _stuffProvider is initialised
</commit_message>
<xml_diff>
--- a/Presentation/Unit Testing in Legacy Code - DErrington.pptx
+++ b/Presentation/Unit Testing in Legacy Code - DErrington.pptx
@@ -630,7 +630,7 @@
         </pc:spChg>
       </pc:sldChg>
       <pc:sldChg chg="addSp delSp modSp add modAnim">
-        <pc:chgData name="Daniel Errington" userId="9fc8d130-2e97-4034-84c2-f15ce46ebed2" providerId="ADAL" clId="{6E97254A-241F-40CC-9EEF-B1D0A312AEA5}" dt="2018-02-21T16:59:14.744" v="4042"/>
+        <pc:chgData name="Daniel Errington" userId="9fc8d130-2e97-4034-84c2-f15ce46ebed2" providerId="ADAL" clId="{6E97254A-241F-40CC-9EEF-B1D0A312AEA5}" dt="2018-02-21T16:59:14.744" v="4042" actId="20577"/>
         <pc:sldMkLst>
           <pc:docMk/>
           <pc:sldMk cId="3821536123" sldId="447"/>
@@ -723,7 +723,7 @@
         </pc:spChg>
       </pc:sldChg>
       <pc:sldChg chg="addSp modSp add modAnim">
-        <pc:chgData name="Daniel Errington" userId="9fc8d130-2e97-4034-84c2-f15ce46ebed2" providerId="ADAL" clId="{6E97254A-241F-40CC-9EEF-B1D0A312AEA5}" dt="2018-02-21T17:42:43.133" v="5259"/>
+        <pc:chgData name="Daniel Errington" userId="9fc8d130-2e97-4034-84c2-f15ce46ebed2" providerId="ADAL" clId="{6E97254A-241F-40CC-9EEF-B1D0A312AEA5}" dt="2018-02-21T17:42:43.133" v="5259" actId="20577"/>
         <pc:sldMkLst>
           <pc:docMk/>
           <pc:sldMk cId="524133214" sldId="450"/>
@@ -4843,10 +4843,10 @@
       </p:sp>
       <p:pic>
         <p:nvPicPr>
-          <p:cNvPr id="6" name="Picture 5">
+          <p:cNvPr id="8" name="Picture 7">
             <a:extLst>
               <a:ext uri="{FF2B5EF4-FFF2-40B4-BE49-F238E27FC236}">
-                <a16:creationId xmlns:a16="http://schemas.microsoft.com/office/drawing/2014/main" id="{682B6436-EE7D-4318-8A0B-A2216A0EAFC9}"/>
+                <a16:creationId xmlns:a16="http://schemas.microsoft.com/office/drawing/2014/main" id="{9AAC1026-C291-4D5B-80C5-8CD785BF93A9}"/>
               </a:ext>
             </a:extLst>
           </p:cNvPr>
@@ -4863,8 +4863,8 @@
         </p:blipFill>
         <p:spPr>
           <a:xfrm>
-            <a:off x="126423" y="795488"/>
-            <a:ext cx="3582848" cy="2153520"/>
+            <a:off x="126423" y="3209762"/>
+            <a:ext cx="4221281" cy="2753838"/>
           </a:xfrm>
           <a:prstGeom prst="rect">
             <a:avLst/>
@@ -4873,10 +4873,10 @@
       </p:pic>
       <p:pic>
         <p:nvPicPr>
-          <p:cNvPr id="8" name="Picture 7">
+          <p:cNvPr id="5" name="Picture 4">
             <a:extLst>
               <a:ext uri="{FF2B5EF4-FFF2-40B4-BE49-F238E27FC236}">
-                <a16:creationId xmlns:a16="http://schemas.microsoft.com/office/drawing/2014/main" id="{9AAC1026-C291-4D5B-80C5-8CD785BF93A9}"/>
+                <a16:creationId xmlns:a16="http://schemas.microsoft.com/office/drawing/2014/main" id="{DA523E81-766A-4F9C-93B7-B1686E4C8742}"/>
               </a:ext>
             </a:extLst>
           </p:cNvPr>
@@ -4893,8 +4893,8 @@
         </p:blipFill>
         <p:spPr>
           <a:xfrm>
-            <a:off x="126423" y="3209762"/>
-            <a:ext cx="4221281" cy="2753838"/>
+            <a:off x="126423" y="799712"/>
+            <a:ext cx="4021175" cy="2258338"/>
           </a:xfrm>
           <a:prstGeom prst="rect">
             <a:avLst/>
@@ -8232,7 +8232,7 @@
           <a:p>
             <a:r>
               <a:rPr lang="en-GB" dirty="0"/>
-              <a:t>Unit testing gives us confidence that when we change code we haven’t broken the existing functionality</a:t>
+              <a:t>Unit testing gives us confidence that when we refactor code we haven’t broken the existing functionality</a:t>
             </a:r>
           </a:p>
           <a:p>
@@ -10561,6 +10561,15 @@
 </file>
 
 <file path=customXml/item1.xml><?xml version="1.0" encoding="utf-8"?>
+<?mso-contentType ?>
+<FormTemplates xmlns="http://schemas.microsoft.com/sharepoint/v3/contenttype/forms">
+  <Display>DocumentLibraryForm</Display>
+  <Edit>DocumentLibraryForm</Edit>
+  <New>DocumentLibraryForm</New>
+</FormTemplates>
+</file>
+
+<file path=customXml/item2.xml><?xml version="1.0" encoding="utf-8"?>
 <ct:contentTypeSchema xmlns:ct="http://schemas.microsoft.com/office/2006/metadata/contentType" xmlns:ma="http://schemas.microsoft.com/office/2006/metadata/properties/metaAttributes" ct:_="" ma:_="" ma:contentTypeName="Document" ma:contentTypeID="0x010100DE768BC3BD8688418DB479A8ACD78C19" ma:contentTypeVersion="0" ma:contentTypeDescription="Create a new document." ma:contentTypeScope="" ma:versionID="d7af05181fac0636a7496051b1358a58">
   <xsd:schema xmlns:xsd="http://www.w3.org/2001/XMLSchema" xmlns:p="http://schemas.microsoft.com/office/2006/metadata/properties" targetNamespace="http://schemas.microsoft.com/office/2006/metadata/properties" ma:root="true" ma:fieldsID="4aeb20c0e3442673af7ee10786458764">
     <xsd:element name="properties">
@@ -10609,15 +10618,6 @@
 </ct:contentTypeSchema>
 </file>
 
-<file path=customXml/item2.xml><?xml version="1.0" encoding="utf-8"?>
-<?mso-contentType ?>
-<FormTemplates xmlns="http://schemas.microsoft.com/sharepoint/v3/contenttype/forms">
-  <Display>DocumentLibraryForm</Display>
-  <Edit>DocumentLibraryForm</Edit>
-  <New>DocumentLibraryForm</New>
-</FormTemplates>
-</file>
-
 <file path=customXml/item3.xml><?xml version="1.0" encoding="utf-8"?>
 <p:properties xmlns:p="http://schemas.microsoft.com/office/2006/metadata/properties" xmlns:xsi="http://www.w3.org/2001/XMLSchema-instance">
   <documentManagement/>
@@ -10625,6 +10625,14 @@
 </file>
 
 <file path=customXml/itemProps1.xml><?xml version="1.0" encoding="utf-8"?>
+<ds:datastoreItem xmlns:ds="http://schemas.openxmlformats.org/officeDocument/2006/customXml" ds:itemID="{46DAB7DB-F330-44FA-A31F-7DCB2E587471}">
+  <ds:schemaRefs>
+    <ds:schemaRef ds:uri="http://schemas.microsoft.com/sharepoint/v3/contenttype/forms"/>
+  </ds:schemaRefs>
+</ds:datastoreItem>
+</file>
+
+<file path=customXml/itemProps2.xml><?xml version="1.0" encoding="utf-8"?>
 <ds:datastoreItem xmlns:ds="http://schemas.openxmlformats.org/officeDocument/2006/customXml" ds:itemID="{25058BEC-C8AA-4075-9178-F48DBD78029C}">
   <ds:schemaRefs>
     <ds:schemaRef ds:uri="http://schemas.microsoft.com/office/2006/metadata/contentType"/>
@@ -10635,14 +10643,6 @@
     <ds:schemaRef ds:uri="http://purl.org/dc/elements/1.1/"/>
     <ds:schemaRef ds:uri="http://purl.org/dc/terms/"/>
     <ds:schemaRef ds:uri="http://schemas.microsoft.com/office/internal/2005/internalDocumentation"/>
-  </ds:schemaRefs>
-</ds:datastoreItem>
-</file>
-
-<file path=customXml/itemProps2.xml><?xml version="1.0" encoding="utf-8"?>
-<ds:datastoreItem xmlns:ds="http://schemas.openxmlformats.org/officeDocument/2006/customXml" ds:itemID="{46DAB7DB-F330-44FA-A31F-7DCB2E587471}">
-  <ds:schemaRefs>
-    <ds:schemaRef ds:uri="http://schemas.microsoft.com/sharepoint/v3/contenttype/forms"/>
   </ds:schemaRefs>
 </ds:datastoreItem>
 </file>

</xml_diff>

<commit_message>
Add method overriding slides
</commit_message>
<xml_diff>
--- a/Presentation/Unit Testing in Legacy Code - DErrington.pptx
+++ b/Presentation/Unit Testing in Legacy Code - DErrington.pptx
@@ -5,10 +5,10 @@
     <p:sldMasterId id="2147483648" r:id="rId4"/>
   </p:sldMasterIdLst>
   <p:notesMasterIdLst>
-    <p:notesMasterId r:id="rId23"/>
+    <p:notesMasterId r:id="rId24"/>
   </p:notesMasterIdLst>
   <p:handoutMasterIdLst>
-    <p:handoutMasterId r:id="rId24"/>
+    <p:handoutMasterId r:id="rId25"/>
   </p:handoutMasterIdLst>
   <p:sldIdLst>
     <p:sldId id="383" r:id="rId5"/>
@@ -21,14 +21,15 @@
     <p:sldId id="445" r:id="rId12"/>
     <p:sldId id="446" r:id="rId13"/>
     <p:sldId id="447" r:id="rId14"/>
-    <p:sldId id="441" r:id="rId15"/>
-    <p:sldId id="449" r:id="rId16"/>
-    <p:sldId id="450" r:id="rId17"/>
-    <p:sldId id="442" r:id="rId18"/>
-    <p:sldId id="452" r:id="rId19"/>
-    <p:sldId id="451" r:id="rId20"/>
-    <p:sldId id="448" r:id="rId21"/>
-    <p:sldId id="443" r:id="rId22"/>
+    <p:sldId id="453" r:id="rId15"/>
+    <p:sldId id="441" r:id="rId16"/>
+    <p:sldId id="449" r:id="rId17"/>
+    <p:sldId id="450" r:id="rId18"/>
+    <p:sldId id="442" r:id="rId19"/>
+    <p:sldId id="452" r:id="rId20"/>
+    <p:sldId id="451" r:id="rId21"/>
+    <p:sldId id="448" r:id="rId22"/>
+    <p:sldId id="443" r:id="rId23"/>
   </p:sldIdLst>
   <p:sldSz cx="12188825" cy="6858000"/>
   <p:notesSz cx="9144000" cy="6858000"/>
@@ -142,6 +143,7 @@
             <p14:sldId id="445"/>
             <p14:sldId id="446"/>
             <p14:sldId id="447"/>
+            <p14:sldId id="453"/>
             <p14:sldId id="441"/>
             <p14:sldId id="449"/>
             <p14:sldId id="450"/>
@@ -4794,10 +4796,18 @@
           <a:p>
             <a:r>
               <a:rPr lang="en-GB" dirty="0"/>
-              <a:t>In this example we would want to replace _</a:t>
-            </a:r>
-            <a:r>
-              <a:rPr lang="en-GB" dirty="0" err="1"/>
+              <a:t>In this example we would want to replace </a:t>
+            </a:r>
+            <a:r>
+              <a:rPr lang="en-GB" sz="2000" dirty="0">
+                <a:latin typeface="Consolas" panose="020B0609020204030204" pitchFamily="49" charset="0"/>
+              </a:rPr>
+              <a:t>_</a:t>
+            </a:r>
+            <a:r>
+              <a:rPr lang="en-GB" sz="2000" dirty="0" err="1">
+                <a:latin typeface="Consolas" panose="020B0609020204030204" pitchFamily="49" charset="0"/>
+              </a:rPr>
               <a:t>stuffProvider</a:t>
             </a:r>
             <a:r>
@@ -4808,7 +4818,7 @@
           <a:p>
             <a:r>
               <a:rPr lang="en-GB" dirty="0"/>
-              <a:t>Fortunately it’s an interface so we can use </a:t>
+              <a:t>Fortunately, it’s an interface so we can use </a:t>
             </a:r>
             <a:r>
               <a:rPr lang="en-GB" dirty="0" err="1"/>
@@ -4830,7 +4840,7 @@
           </a:p>
           <a:p>
             <a:r>
-              <a:rPr lang="en-GB" dirty="0" err="1">
+              <a:rPr lang="en-GB" sz="2000" dirty="0" err="1">
                 <a:latin typeface="Consolas" panose="020B0609020204030204" pitchFamily="49" charset="0"/>
               </a:rPr>
               <a:t>ReflectionHelper.SetPrivateField</a:t>
@@ -5065,6 +5075,686 @@
           <p:cNvPr id="2" name="Slide Number Placeholder 1">
             <a:extLst>
               <a:ext uri="{FF2B5EF4-FFF2-40B4-BE49-F238E27FC236}">
+                <a16:creationId xmlns:a16="http://schemas.microsoft.com/office/drawing/2014/main" id="{4A2A4A26-9CB1-4B3C-915D-871FA021DD16}"/>
+              </a:ext>
+            </a:extLst>
+          </p:cNvPr>
+          <p:cNvSpPr>
+            <a:spLocks noGrp="1"/>
+          </p:cNvSpPr>
+          <p:nvPr>
+            <p:ph type="sldNum" sz="quarter" idx="14"/>
+          </p:nvPr>
+        </p:nvSpPr>
+        <p:spPr/>
+        <p:txBody>
+          <a:bodyPr/>
+          <a:lstStyle/>
+          <a:p>
+            <a:fld id="{F3027E8A-8089-874A-B94B-79D229332FD1}" type="slidenum">
+              <a:rPr lang="en-US" smtClean="0"/>
+              <a:pPr/>
+              <a:t>11</a:t>
+            </a:fld>
+            <a:endParaRPr lang="en-US" dirty="0"/>
+          </a:p>
+        </p:txBody>
+      </p:sp>
+      <p:sp>
+        <p:nvSpPr>
+          <p:cNvPr id="3" name="Title 2">
+            <a:extLst>
+              <a:ext uri="{FF2B5EF4-FFF2-40B4-BE49-F238E27FC236}">
+                <a16:creationId xmlns:a16="http://schemas.microsoft.com/office/drawing/2014/main" id="{30826572-0B45-47D1-8319-DE857467FD4F}"/>
+              </a:ext>
+            </a:extLst>
+          </p:cNvPr>
+          <p:cNvSpPr>
+            <a:spLocks noGrp="1"/>
+          </p:cNvSpPr>
+          <p:nvPr>
+            <p:ph type="title"/>
+          </p:nvPr>
+        </p:nvSpPr>
+        <p:spPr/>
+        <p:txBody>
+          <a:bodyPr/>
+          <a:lstStyle/>
+          <a:p>
+            <a:r>
+              <a:rPr lang="en-GB" dirty="0"/>
+              <a:t>Overriding methods</a:t>
+            </a:r>
+          </a:p>
+        </p:txBody>
+      </p:sp>
+      <p:sp>
+        <p:nvSpPr>
+          <p:cNvPr id="4" name="Text Placeholder 3">
+            <a:extLst>
+              <a:ext uri="{FF2B5EF4-FFF2-40B4-BE49-F238E27FC236}">
+                <a16:creationId xmlns:a16="http://schemas.microsoft.com/office/drawing/2014/main" id="{01B727D6-DA0B-4B14-A606-C4193017B178}"/>
+              </a:ext>
+            </a:extLst>
+          </p:cNvPr>
+          <p:cNvSpPr>
+            <a:spLocks noGrp="1"/>
+          </p:cNvSpPr>
+          <p:nvPr>
+            <p:ph type="body" sz="quarter" idx="15"/>
+          </p:nvPr>
+        </p:nvSpPr>
+        <p:spPr/>
+        <p:txBody>
+          <a:bodyPr/>
+          <a:lstStyle/>
+          <a:p>
+            <a:r>
+              <a:rPr lang="en-GB" dirty="0"/>
+              <a:t>In the previous example the field </a:t>
+            </a:r>
+            <a:r>
+              <a:rPr lang="en-GB" sz="2000" dirty="0">
+                <a:latin typeface="Consolas" panose="020B0609020204030204" pitchFamily="49" charset="0"/>
+              </a:rPr>
+              <a:t>_</a:t>
+            </a:r>
+            <a:r>
+              <a:rPr lang="en-GB" sz="2000" dirty="0" err="1">
+                <a:latin typeface="Consolas" panose="020B0609020204030204" pitchFamily="49" charset="0"/>
+              </a:rPr>
+              <a:t>stuffProvider</a:t>
+            </a:r>
+            <a:r>
+              <a:rPr lang="en-GB" dirty="0"/>
+              <a:t> referenced an interface. But what if it hadn’t?</a:t>
+            </a:r>
+          </a:p>
+          <a:p>
+            <a:r>
+              <a:rPr lang="en-GB" dirty="0"/>
+              <a:t>We can still access the field and change it but need a way of overriding the methods without a mocking tool.</a:t>
+            </a:r>
+          </a:p>
+          <a:p>
+            <a:r>
+              <a:rPr lang="en-GB" dirty="0"/>
+              <a:t>Make the method </a:t>
+            </a:r>
+            <a:r>
+              <a:rPr lang="en-GB" sz="2000" dirty="0">
+                <a:latin typeface="Consolas" panose="020B0609020204030204" pitchFamily="49" charset="0"/>
+              </a:rPr>
+              <a:t>virtual</a:t>
+            </a:r>
+            <a:r>
+              <a:rPr lang="en-GB" dirty="0"/>
+              <a:t>!</a:t>
+            </a:r>
+          </a:p>
+        </p:txBody>
+      </p:sp>
+      <p:pic>
+        <p:nvPicPr>
+          <p:cNvPr id="6" name="Picture 5">
+            <a:extLst>
+              <a:ext uri="{FF2B5EF4-FFF2-40B4-BE49-F238E27FC236}">
+                <a16:creationId xmlns:a16="http://schemas.microsoft.com/office/drawing/2014/main" id="{EC79719B-EE86-42FC-8A7A-B545399E8BA6}"/>
+              </a:ext>
+            </a:extLst>
+          </p:cNvPr>
+          <p:cNvPicPr>
+            <a:picLocks noChangeAspect="1"/>
+          </p:cNvPicPr>
+          <p:nvPr/>
+        </p:nvPicPr>
+        <p:blipFill>
+          <a:blip r:embed="rId2"/>
+          <a:stretch>
+            <a:fillRect/>
+          </a:stretch>
+        </p:blipFill>
+        <p:spPr>
+          <a:xfrm>
+            <a:off x="593724" y="3419471"/>
+            <a:ext cx="3115934" cy="1791424"/>
+          </a:xfrm>
+          <a:prstGeom prst="rect">
+            <a:avLst/>
+          </a:prstGeom>
+        </p:spPr>
+      </p:pic>
+      <p:pic>
+        <p:nvPicPr>
+          <p:cNvPr id="7" name="Picture 6">
+            <a:extLst>
+              <a:ext uri="{FF2B5EF4-FFF2-40B4-BE49-F238E27FC236}">
+                <a16:creationId xmlns:a16="http://schemas.microsoft.com/office/drawing/2014/main" id="{44D5D529-C42A-4739-9047-DA24B2100F62}"/>
+              </a:ext>
+            </a:extLst>
+          </p:cNvPr>
+          <p:cNvPicPr>
+            <a:picLocks noChangeAspect="1"/>
+          </p:cNvPicPr>
+          <p:nvPr/>
+        </p:nvPicPr>
+        <p:blipFill>
+          <a:blip r:embed="rId3"/>
+          <a:stretch>
+            <a:fillRect/>
+          </a:stretch>
+        </p:blipFill>
+        <p:spPr>
+          <a:xfrm>
+            <a:off x="3962891" y="3429000"/>
+            <a:ext cx="3697194" cy="1810482"/>
+          </a:xfrm>
+          <a:prstGeom prst="rect">
+            <a:avLst/>
+          </a:prstGeom>
+        </p:spPr>
+      </p:pic>
+      <p:pic>
+        <p:nvPicPr>
+          <p:cNvPr id="8" name="Picture 7">
+            <a:extLst>
+              <a:ext uri="{FF2B5EF4-FFF2-40B4-BE49-F238E27FC236}">
+                <a16:creationId xmlns:a16="http://schemas.microsoft.com/office/drawing/2014/main" id="{C2D8852E-2C3E-4887-A587-38BAC635A8A8}"/>
+              </a:ext>
+            </a:extLst>
+          </p:cNvPr>
+          <p:cNvPicPr>
+            <a:picLocks noChangeAspect="1"/>
+          </p:cNvPicPr>
+          <p:nvPr/>
+        </p:nvPicPr>
+        <p:blipFill>
+          <a:blip r:embed="rId4"/>
+          <a:stretch>
+            <a:fillRect/>
+          </a:stretch>
+        </p:blipFill>
+        <p:spPr>
+          <a:xfrm>
+            <a:off x="7913319" y="3419471"/>
+            <a:ext cx="3773425" cy="1172049"/>
+          </a:xfrm>
+          <a:prstGeom prst="rect">
+            <a:avLst/>
+          </a:prstGeom>
+        </p:spPr>
+      </p:pic>
+      <p:cxnSp>
+        <p:nvCxnSpPr>
+          <p:cNvPr id="10" name="Straight Connector 9">
+            <a:extLst>
+              <a:ext uri="{FF2B5EF4-FFF2-40B4-BE49-F238E27FC236}">
+                <a16:creationId xmlns:a16="http://schemas.microsoft.com/office/drawing/2014/main" id="{B9381F02-459E-43BF-AFCB-A1970D296448}"/>
+              </a:ext>
+            </a:extLst>
+          </p:cNvPr>
+          <p:cNvCxnSpPr/>
+          <p:nvPr/>
+        </p:nvCxnSpPr>
+        <p:spPr>
+          <a:xfrm>
+            <a:off x="4815281" y="3942826"/>
+            <a:ext cx="494950" cy="0"/>
+          </a:xfrm>
+          <a:prstGeom prst="line">
+            <a:avLst/>
+          </a:prstGeom>
+          <a:ln>
+            <a:solidFill>
+              <a:srgbClr val="FFC000"/>
+            </a:solidFill>
+          </a:ln>
+        </p:spPr>
+        <p:style>
+          <a:lnRef idx="2">
+            <a:schemeClr val="accent1"/>
+          </a:lnRef>
+          <a:fillRef idx="0">
+            <a:schemeClr val="accent1"/>
+          </a:fillRef>
+          <a:effectRef idx="1">
+            <a:schemeClr val="accent1"/>
+          </a:effectRef>
+          <a:fontRef idx="minor">
+            <a:schemeClr val="tx1"/>
+          </a:fontRef>
+        </p:style>
+      </p:cxnSp>
+    </p:spTree>
+    <p:extLst>
+      <p:ext uri="{BB962C8B-B14F-4D97-AF65-F5344CB8AC3E}">
+        <p14:creationId xmlns:p14="http://schemas.microsoft.com/office/powerpoint/2010/main" val="3271798783"/>
+      </p:ext>
+    </p:extLst>
+  </p:cSld>
+  <p:clrMapOvr>
+    <a:masterClrMapping/>
+  </p:clrMapOvr>
+  <p:timing>
+    <p:tnLst>
+      <p:par>
+        <p:cTn id="1" dur="indefinite" restart="never" nodeType="tmRoot">
+          <p:childTnLst>
+            <p:seq concurrent="1" nextAc="seek">
+              <p:cTn id="2" dur="indefinite" nodeType="mainSeq">
+                <p:childTnLst>
+                  <p:par>
+                    <p:cTn id="3" fill="hold">
+                      <p:stCondLst>
+                        <p:cond delay="indefinite"/>
+                        <p:cond evt="onBegin" delay="0">
+                          <p:tn val="2"/>
+                        </p:cond>
+                      </p:stCondLst>
+                      <p:childTnLst>
+                        <p:par>
+                          <p:cTn id="4" fill="hold">
+                            <p:stCondLst>
+                              <p:cond delay="0"/>
+                            </p:stCondLst>
+                            <p:childTnLst>
+                              <p:par>
+                                <p:cTn id="5" presetID="10" presetClass="entr" presetSubtype="0" fill="hold" grpId="0" nodeType="withEffect">
+                                  <p:stCondLst>
+                                    <p:cond delay="0"/>
+                                  </p:stCondLst>
+                                  <p:childTnLst>
+                                    <p:set>
+                                      <p:cBhvr>
+                                        <p:cTn id="6" dur="1" fill="hold">
+                                          <p:stCondLst>
+                                            <p:cond delay="0"/>
+                                          </p:stCondLst>
+                                        </p:cTn>
+                                        <p:tgtEl>
+                                          <p:spTgt spid="4">
+                                            <p:txEl>
+                                              <p:pRg st="0" end="0"/>
+                                            </p:txEl>
+                                          </p:spTgt>
+                                        </p:tgtEl>
+                                        <p:attrNameLst>
+                                          <p:attrName>style.visibility</p:attrName>
+                                        </p:attrNameLst>
+                                      </p:cBhvr>
+                                      <p:to>
+                                        <p:strVal val="visible"/>
+                                      </p:to>
+                                    </p:set>
+                                    <p:animEffect transition="in" filter="fade">
+                                      <p:cBhvr>
+                                        <p:cTn id="7" dur="500"/>
+                                        <p:tgtEl>
+                                          <p:spTgt spid="4">
+                                            <p:txEl>
+                                              <p:pRg st="0" end="0"/>
+                                            </p:txEl>
+                                          </p:spTgt>
+                                        </p:tgtEl>
+                                      </p:cBhvr>
+                                    </p:animEffect>
+                                  </p:childTnLst>
+                                </p:cTn>
+                              </p:par>
+                              <p:par>
+                                <p:cTn id="8" presetID="10" presetClass="entr" presetSubtype="0" fill="hold" grpId="0" nodeType="withEffect">
+                                  <p:stCondLst>
+                                    <p:cond delay="0"/>
+                                  </p:stCondLst>
+                                  <p:childTnLst>
+                                    <p:set>
+                                      <p:cBhvr>
+                                        <p:cTn id="9" dur="1" fill="hold">
+                                          <p:stCondLst>
+                                            <p:cond delay="0"/>
+                                          </p:stCondLst>
+                                        </p:cTn>
+                                        <p:tgtEl>
+                                          <p:spTgt spid="4">
+                                            <p:txEl>
+                                              <p:pRg st="1" end="1"/>
+                                            </p:txEl>
+                                          </p:spTgt>
+                                        </p:tgtEl>
+                                        <p:attrNameLst>
+                                          <p:attrName>style.visibility</p:attrName>
+                                        </p:attrNameLst>
+                                      </p:cBhvr>
+                                      <p:to>
+                                        <p:strVal val="visible"/>
+                                      </p:to>
+                                    </p:set>
+                                    <p:animEffect transition="in" filter="fade">
+                                      <p:cBhvr>
+                                        <p:cTn id="10" dur="500"/>
+                                        <p:tgtEl>
+                                          <p:spTgt spid="4">
+                                            <p:txEl>
+                                              <p:pRg st="1" end="1"/>
+                                            </p:txEl>
+                                          </p:spTgt>
+                                        </p:tgtEl>
+                                      </p:cBhvr>
+                                    </p:animEffect>
+                                  </p:childTnLst>
+                                </p:cTn>
+                              </p:par>
+                            </p:childTnLst>
+                          </p:cTn>
+                        </p:par>
+                      </p:childTnLst>
+                    </p:cTn>
+                  </p:par>
+                  <p:par>
+                    <p:cTn id="11" fill="hold">
+                      <p:stCondLst>
+                        <p:cond delay="indefinite"/>
+                      </p:stCondLst>
+                      <p:childTnLst>
+                        <p:par>
+                          <p:cTn id="12" fill="hold">
+                            <p:stCondLst>
+                              <p:cond delay="0"/>
+                            </p:stCondLst>
+                            <p:childTnLst>
+                              <p:par>
+                                <p:cTn id="13" presetID="10" presetClass="entr" presetSubtype="0" fill="hold" grpId="0" nodeType="clickEffect">
+                                  <p:stCondLst>
+                                    <p:cond delay="0"/>
+                                  </p:stCondLst>
+                                  <p:childTnLst>
+                                    <p:set>
+                                      <p:cBhvr>
+                                        <p:cTn id="14" dur="1" fill="hold">
+                                          <p:stCondLst>
+                                            <p:cond delay="0"/>
+                                          </p:stCondLst>
+                                        </p:cTn>
+                                        <p:tgtEl>
+                                          <p:spTgt spid="4">
+                                            <p:txEl>
+                                              <p:pRg st="2" end="2"/>
+                                            </p:txEl>
+                                          </p:spTgt>
+                                        </p:tgtEl>
+                                        <p:attrNameLst>
+                                          <p:attrName>style.visibility</p:attrName>
+                                        </p:attrNameLst>
+                                      </p:cBhvr>
+                                      <p:to>
+                                        <p:strVal val="visible"/>
+                                      </p:to>
+                                    </p:set>
+                                    <p:animEffect transition="in" filter="fade">
+                                      <p:cBhvr>
+                                        <p:cTn id="15" dur="500"/>
+                                        <p:tgtEl>
+                                          <p:spTgt spid="4">
+                                            <p:txEl>
+                                              <p:pRg st="2" end="2"/>
+                                            </p:txEl>
+                                          </p:spTgt>
+                                        </p:tgtEl>
+                                      </p:cBhvr>
+                                    </p:animEffect>
+                                  </p:childTnLst>
+                                </p:cTn>
+                              </p:par>
+                            </p:childTnLst>
+                          </p:cTn>
+                        </p:par>
+                      </p:childTnLst>
+                    </p:cTn>
+                  </p:par>
+                  <p:par>
+                    <p:cTn id="16" fill="hold">
+                      <p:stCondLst>
+                        <p:cond delay="indefinite"/>
+                      </p:stCondLst>
+                      <p:childTnLst>
+                        <p:par>
+                          <p:cTn id="17" fill="hold">
+                            <p:stCondLst>
+                              <p:cond delay="0"/>
+                            </p:stCondLst>
+                            <p:childTnLst>
+                              <p:par>
+                                <p:cTn id="18" presetID="10" presetClass="entr" presetSubtype="0" fill="hold" nodeType="clickEffect">
+                                  <p:stCondLst>
+                                    <p:cond delay="0"/>
+                                  </p:stCondLst>
+                                  <p:childTnLst>
+                                    <p:set>
+                                      <p:cBhvr>
+                                        <p:cTn id="19" dur="1" fill="hold">
+                                          <p:stCondLst>
+                                            <p:cond delay="0"/>
+                                          </p:stCondLst>
+                                        </p:cTn>
+                                        <p:tgtEl>
+                                          <p:spTgt spid="6"/>
+                                        </p:tgtEl>
+                                        <p:attrNameLst>
+                                          <p:attrName>style.visibility</p:attrName>
+                                        </p:attrNameLst>
+                                      </p:cBhvr>
+                                      <p:to>
+                                        <p:strVal val="visible"/>
+                                      </p:to>
+                                    </p:set>
+                                    <p:animEffect transition="in" filter="fade">
+                                      <p:cBhvr>
+                                        <p:cTn id="20" dur="500"/>
+                                        <p:tgtEl>
+                                          <p:spTgt spid="6"/>
+                                        </p:tgtEl>
+                                      </p:cBhvr>
+                                    </p:animEffect>
+                                  </p:childTnLst>
+                                </p:cTn>
+                              </p:par>
+                            </p:childTnLst>
+                          </p:cTn>
+                        </p:par>
+                      </p:childTnLst>
+                    </p:cTn>
+                  </p:par>
+                  <p:par>
+                    <p:cTn id="21" fill="hold">
+                      <p:stCondLst>
+                        <p:cond delay="indefinite"/>
+                      </p:stCondLst>
+                      <p:childTnLst>
+                        <p:par>
+                          <p:cTn id="22" fill="hold">
+                            <p:stCondLst>
+                              <p:cond delay="0"/>
+                            </p:stCondLst>
+                            <p:childTnLst>
+                              <p:par>
+                                <p:cTn id="23" presetID="10" presetClass="entr" presetSubtype="0" fill="hold" nodeType="clickEffect">
+                                  <p:stCondLst>
+                                    <p:cond delay="0"/>
+                                  </p:stCondLst>
+                                  <p:childTnLst>
+                                    <p:set>
+                                      <p:cBhvr>
+                                        <p:cTn id="24" dur="1" fill="hold">
+                                          <p:stCondLst>
+                                            <p:cond delay="0"/>
+                                          </p:stCondLst>
+                                        </p:cTn>
+                                        <p:tgtEl>
+                                          <p:spTgt spid="7"/>
+                                        </p:tgtEl>
+                                        <p:attrNameLst>
+                                          <p:attrName>style.visibility</p:attrName>
+                                        </p:attrNameLst>
+                                      </p:cBhvr>
+                                      <p:to>
+                                        <p:strVal val="visible"/>
+                                      </p:to>
+                                    </p:set>
+                                    <p:animEffect transition="in" filter="fade">
+                                      <p:cBhvr>
+                                        <p:cTn id="25" dur="500"/>
+                                        <p:tgtEl>
+                                          <p:spTgt spid="7"/>
+                                        </p:tgtEl>
+                                      </p:cBhvr>
+                                    </p:animEffect>
+                                  </p:childTnLst>
+                                </p:cTn>
+                              </p:par>
+                              <p:par>
+                                <p:cTn id="26" presetID="10" presetClass="entr" presetSubtype="0" fill="hold" nodeType="withEffect">
+                                  <p:stCondLst>
+                                    <p:cond delay="0"/>
+                                  </p:stCondLst>
+                                  <p:childTnLst>
+                                    <p:set>
+                                      <p:cBhvr>
+                                        <p:cTn id="27" dur="1" fill="hold">
+                                          <p:stCondLst>
+                                            <p:cond delay="0"/>
+                                          </p:stCondLst>
+                                        </p:cTn>
+                                        <p:tgtEl>
+                                          <p:spTgt spid="10"/>
+                                        </p:tgtEl>
+                                        <p:attrNameLst>
+                                          <p:attrName>style.visibility</p:attrName>
+                                        </p:attrNameLst>
+                                      </p:cBhvr>
+                                      <p:to>
+                                        <p:strVal val="visible"/>
+                                      </p:to>
+                                    </p:set>
+                                    <p:animEffect transition="in" filter="fade">
+                                      <p:cBhvr>
+                                        <p:cTn id="28" dur="500"/>
+                                        <p:tgtEl>
+                                          <p:spTgt spid="10"/>
+                                        </p:tgtEl>
+                                      </p:cBhvr>
+                                    </p:animEffect>
+                                  </p:childTnLst>
+                                </p:cTn>
+                              </p:par>
+                            </p:childTnLst>
+                          </p:cTn>
+                        </p:par>
+                      </p:childTnLst>
+                    </p:cTn>
+                  </p:par>
+                  <p:par>
+                    <p:cTn id="29" fill="hold">
+                      <p:stCondLst>
+                        <p:cond delay="indefinite"/>
+                      </p:stCondLst>
+                      <p:childTnLst>
+                        <p:par>
+                          <p:cTn id="30" fill="hold">
+                            <p:stCondLst>
+                              <p:cond delay="0"/>
+                            </p:stCondLst>
+                            <p:childTnLst>
+                              <p:par>
+                                <p:cTn id="31" presetID="10" presetClass="entr" presetSubtype="0" fill="hold" nodeType="clickEffect">
+                                  <p:stCondLst>
+                                    <p:cond delay="0"/>
+                                  </p:stCondLst>
+                                  <p:childTnLst>
+                                    <p:set>
+                                      <p:cBhvr>
+                                        <p:cTn id="32" dur="1" fill="hold">
+                                          <p:stCondLst>
+                                            <p:cond delay="0"/>
+                                          </p:stCondLst>
+                                        </p:cTn>
+                                        <p:tgtEl>
+                                          <p:spTgt spid="8"/>
+                                        </p:tgtEl>
+                                        <p:attrNameLst>
+                                          <p:attrName>style.visibility</p:attrName>
+                                        </p:attrNameLst>
+                                      </p:cBhvr>
+                                      <p:to>
+                                        <p:strVal val="visible"/>
+                                      </p:to>
+                                    </p:set>
+                                    <p:animEffect transition="in" filter="fade">
+                                      <p:cBhvr>
+                                        <p:cTn id="33" dur="500"/>
+                                        <p:tgtEl>
+                                          <p:spTgt spid="8"/>
+                                        </p:tgtEl>
+                                      </p:cBhvr>
+                                    </p:animEffect>
+                                  </p:childTnLst>
+                                </p:cTn>
+                              </p:par>
+                            </p:childTnLst>
+                          </p:cTn>
+                        </p:par>
+                      </p:childTnLst>
+                    </p:cTn>
+                  </p:par>
+                </p:childTnLst>
+              </p:cTn>
+              <p:prevCondLst>
+                <p:cond evt="onPrev" delay="0">
+                  <p:tgtEl>
+                    <p:sldTgt/>
+                  </p:tgtEl>
+                </p:cond>
+              </p:prevCondLst>
+              <p:nextCondLst>
+                <p:cond evt="onNext" delay="0">
+                  <p:tgtEl>
+                    <p:sldTgt/>
+                  </p:tgtEl>
+                </p:cond>
+              </p:nextCondLst>
+            </p:seq>
+          </p:childTnLst>
+        </p:cTn>
+      </p:par>
+    </p:tnLst>
+    <p:bldLst>
+      <p:bldP spid="4" grpId="0" uiExpand="1" build="p"/>
+    </p:bldLst>
+  </p:timing>
+</p:sld>
+</file>
+
+<file path=ppt/slides/slide12.xml><?xml version="1.0" encoding="utf-8"?>
+<p:sld xmlns:a="http://schemas.openxmlformats.org/drawingml/2006/main" xmlns:r="http://schemas.openxmlformats.org/officeDocument/2006/relationships" xmlns:p="http://schemas.openxmlformats.org/presentationml/2006/main">
+  <p:cSld>
+    <p:spTree>
+      <p:nvGrpSpPr>
+        <p:cNvPr id="1" name=""/>
+        <p:cNvGrpSpPr/>
+        <p:nvPr/>
+      </p:nvGrpSpPr>
+      <p:grpSpPr>
+        <a:xfrm>
+          <a:off x="0" y="0"/>
+          <a:ext cx="0" cy="0"/>
+          <a:chOff x="0" y="0"/>
+          <a:chExt cx="0" cy="0"/>
+        </a:xfrm>
+      </p:grpSpPr>
+      <p:sp>
+        <p:nvSpPr>
+          <p:cNvPr id="2" name="Slide Number Placeholder 1">
+            <a:extLst>
+              <a:ext uri="{FF2B5EF4-FFF2-40B4-BE49-F238E27FC236}">
                 <a16:creationId xmlns:a16="http://schemas.microsoft.com/office/drawing/2014/main" id="{22959246-7C63-4B31-8731-C451950D7FE9}"/>
               </a:ext>
             </a:extLst>
@@ -5084,7 +5774,7 @@
             <a:fld id="{F3027E8A-8089-874A-B94B-79D229332FD1}" type="slidenum">
               <a:rPr lang="en-US" smtClean="0"/>
               <a:pPr/>
-              <a:t>11</a:t>
+              <a:t>12</a:t>
             </a:fld>
             <a:endParaRPr lang="en-US" dirty="0"/>
           </a:p>
@@ -5348,185 +6038,6 @@
 </p:sld>
 </file>
 
-<file path=ppt/slides/slide12.xml><?xml version="1.0" encoding="utf-8"?>
-<p:sld xmlns:a="http://schemas.openxmlformats.org/drawingml/2006/main" xmlns:r="http://schemas.openxmlformats.org/officeDocument/2006/relationships" xmlns:p="http://schemas.openxmlformats.org/presentationml/2006/main">
-  <p:cSld>
-    <p:spTree>
-      <p:nvGrpSpPr>
-        <p:cNvPr id="1" name=""/>
-        <p:cNvGrpSpPr/>
-        <p:nvPr/>
-      </p:nvGrpSpPr>
-      <p:grpSpPr>
-        <a:xfrm>
-          <a:off x="0" y="0"/>
-          <a:ext cx="0" cy="0"/>
-          <a:chOff x="0" y="0"/>
-          <a:chExt cx="0" cy="0"/>
-        </a:xfrm>
-      </p:grpSpPr>
-      <p:sp>
-        <p:nvSpPr>
-          <p:cNvPr id="2" name="Slide Number Placeholder 1">
-            <a:extLst>
-              <a:ext uri="{FF2B5EF4-FFF2-40B4-BE49-F238E27FC236}">
-                <a16:creationId xmlns:a16="http://schemas.microsoft.com/office/drawing/2014/main" id="{3EF51148-D492-45CC-ABE9-2CC36AE5CAF1}"/>
-              </a:ext>
-            </a:extLst>
-          </p:cNvPr>
-          <p:cNvSpPr>
-            <a:spLocks noGrp="1"/>
-          </p:cNvSpPr>
-          <p:nvPr>
-            <p:ph type="sldNum" sz="quarter" idx="14"/>
-          </p:nvPr>
-        </p:nvSpPr>
-        <p:spPr/>
-        <p:txBody>
-          <a:bodyPr/>
-          <a:lstStyle/>
-          <a:p>
-            <a:fld id="{F3027E8A-8089-874A-B94B-79D229332FD1}" type="slidenum">
-              <a:rPr lang="en-US" smtClean="0"/>
-              <a:pPr/>
-              <a:t>12</a:t>
-            </a:fld>
-            <a:endParaRPr lang="en-US" dirty="0"/>
-          </a:p>
-        </p:txBody>
-      </p:sp>
-      <p:sp>
-        <p:nvSpPr>
-          <p:cNvPr id="3" name="Title 2">
-            <a:extLst>
-              <a:ext uri="{FF2B5EF4-FFF2-40B4-BE49-F238E27FC236}">
-                <a16:creationId xmlns:a16="http://schemas.microsoft.com/office/drawing/2014/main" id="{44BE32BF-31F6-44F8-96D3-13AC577883BF}"/>
-              </a:ext>
-            </a:extLst>
-          </p:cNvPr>
-          <p:cNvSpPr>
-            <a:spLocks noGrp="1"/>
-          </p:cNvSpPr>
-          <p:nvPr>
-            <p:ph type="title"/>
-          </p:nvPr>
-        </p:nvSpPr>
-        <p:spPr/>
-        <p:txBody>
-          <a:bodyPr/>
-          <a:lstStyle/>
-          <a:p>
-            <a:r>
-              <a:rPr lang="en-GB" dirty="0" err="1"/>
-              <a:t>MethodReplacer</a:t>
-            </a:r>
-            <a:endParaRPr lang="en-GB" dirty="0"/>
-          </a:p>
-        </p:txBody>
-      </p:sp>
-      <p:sp>
-        <p:nvSpPr>
-          <p:cNvPr id="4" name="Text Placeholder 3">
-            <a:extLst>
-              <a:ext uri="{FF2B5EF4-FFF2-40B4-BE49-F238E27FC236}">
-                <a16:creationId xmlns:a16="http://schemas.microsoft.com/office/drawing/2014/main" id="{23E7BDB9-9C52-4051-B2C0-9D3114AE33C2}"/>
-              </a:ext>
-            </a:extLst>
-          </p:cNvPr>
-          <p:cNvSpPr>
-            <a:spLocks noGrp="1"/>
-          </p:cNvSpPr>
-          <p:nvPr>
-            <p:ph type="body" sz="quarter" idx="15"/>
-          </p:nvPr>
-        </p:nvSpPr>
-        <p:spPr/>
-        <p:txBody>
-          <a:bodyPr/>
-          <a:lstStyle/>
-          <a:p>
-            <a:r>
-              <a:rPr lang="en-GB" dirty="0"/>
-              <a:t>The </a:t>
-            </a:r>
-            <a:r>
-              <a:rPr lang="en-GB" sz="2000" dirty="0" err="1">
-                <a:latin typeface="Consolas" panose="020B0609020204030204" pitchFamily="49" charset="0"/>
-              </a:rPr>
-              <a:t>MethodReplacer.ReplaceMethod</a:t>
-            </a:r>
-            <a:r>
-              <a:rPr lang="en-GB" dirty="0"/>
-              <a:t> method allows us to replace some methods with our own code.</a:t>
-            </a:r>
-          </a:p>
-          <a:p>
-            <a:r>
-              <a:rPr lang="en-GB" dirty="0"/>
-              <a:t>Once replaced, every call to this method on any instance of an object will call our code.</a:t>
-            </a:r>
-          </a:p>
-          <a:p>
-            <a:r>
-              <a:rPr lang="en-GB" dirty="0"/>
-              <a:t>There are some restrictions:</a:t>
-            </a:r>
-          </a:p>
-          <a:p>
-            <a:pPr lvl="1"/>
-            <a:r>
-              <a:rPr lang="en-GB" dirty="0"/>
-              <a:t>It can’t replace constructors on objects</a:t>
-            </a:r>
-          </a:p>
-          <a:p>
-            <a:pPr lvl="1"/>
-            <a:r>
-              <a:rPr lang="en-GB" dirty="0"/>
-              <a:t>It can’t replace methods on Form objects</a:t>
-            </a:r>
-          </a:p>
-          <a:p>
-            <a:pPr lvl="1"/>
-            <a:r>
-              <a:rPr lang="en-GB" dirty="0"/>
-              <a:t>It can’t replace methods in the same class that they’re called from</a:t>
-            </a:r>
-          </a:p>
-          <a:p>
-            <a:pPr lvl="1"/>
-            <a:r>
-              <a:rPr lang="en-GB" dirty="0"/>
-              <a:t>Once a method has been replaced it can’t be replaced again or reinstated</a:t>
-            </a:r>
-          </a:p>
-          <a:p>
-            <a:r>
-              <a:rPr lang="en-GB" dirty="0"/>
-              <a:t>This function is powerful but could also lead to complicated setup if used too much.</a:t>
-            </a:r>
-          </a:p>
-          <a:p>
-            <a:r>
-              <a:rPr lang="en-GB" dirty="0"/>
-              <a:t>Only use when you absolutely have to!</a:t>
-            </a:r>
-          </a:p>
-        </p:txBody>
-      </p:sp>
-    </p:spTree>
-    <p:extLst>
-      <p:ext uri="{BB962C8B-B14F-4D97-AF65-F5344CB8AC3E}">
-        <p14:creationId xmlns:p14="http://schemas.microsoft.com/office/powerpoint/2010/main" val="756183182"/>
-      </p:ext>
-    </p:extLst>
-  </p:cSld>
-  <p:clrMapOvr>
-    <a:masterClrMapping/>
-  </p:clrMapOvr>
-</p:sld>
-</file>
-
 <file path=ppt/slides/slide13.xml><?xml version="1.0" encoding="utf-8"?>
 <p:sld xmlns:a="http://schemas.openxmlformats.org/drawingml/2006/main" xmlns:r="http://schemas.openxmlformats.org/officeDocument/2006/relationships" xmlns:p="http://schemas.openxmlformats.org/presentationml/2006/main">
   <p:cSld>
@@ -5549,6 +6060,185 @@
           <p:cNvPr id="2" name="Slide Number Placeholder 1">
             <a:extLst>
               <a:ext uri="{FF2B5EF4-FFF2-40B4-BE49-F238E27FC236}">
+                <a16:creationId xmlns:a16="http://schemas.microsoft.com/office/drawing/2014/main" id="{3EF51148-D492-45CC-ABE9-2CC36AE5CAF1}"/>
+              </a:ext>
+            </a:extLst>
+          </p:cNvPr>
+          <p:cNvSpPr>
+            <a:spLocks noGrp="1"/>
+          </p:cNvSpPr>
+          <p:nvPr>
+            <p:ph type="sldNum" sz="quarter" idx="14"/>
+          </p:nvPr>
+        </p:nvSpPr>
+        <p:spPr/>
+        <p:txBody>
+          <a:bodyPr/>
+          <a:lstStyle/>
+          <a:p>
+            <a:fld id="{F3027E8A-8089-874A-B94B-79D229332FD1}" type="slidenum">
+              <a:rPr lang="en-US" smtClean="0"/>
+              <a:pPr/>
+              <a:t>13</a:t>
+            </a:fld>
+            <a:endParaRPr lang="en-US" dirty="0"/>
+          </a:p>
+        </p:txBody>
+      </p:sp>
+      <p:sp>
+        <p:nvSpPr>
+          <p:cNvPr id="3" name="Title 2">
+            <a:extLst>
+              <a:ext uri="{FF2B5EF4-FFF2-40B4-BE49-F238E27FC236}">
+                <a16:creationId xmlns:a16="http://schemas.microsoft.com/office/drawing/2014/main" id="{44BE32BF-31F6-44F8-96D3-13AC577883BF}"/>
+              </a:ext>
+            </a:extLst>
+          </p:cNvPr>
+          <p:cNvSpPr>
+            <a:spLocks noGrp="1"/>
+          </p:cNvSpPr>
+          <p:nvPr>
+            <p:ph type="title"/>
+          </p:nvPr>
+        </p:nvSpPr>
+        <p:spPr/>
+        <p:txBody>
+          <a:bodyPr/>
+          <a:lstStyle/>
+          <a:p>
+            <a:r>
+              <a:rPr lang="en-GB" dirty="0" err="1"/>
+              <a:t>MethodReplacer</a:t>
+            </a:r>
+            <a:endParaRPr lang="en-GB" dirty="0"/>
+          </a:p>
+        </p:txBody>
+      </p:sp>
+      <p:sp>
+        <p:nvSpPr>
+          <p:cNvPr id="4" name="Text Placeholder 3">
+            <a:extLst>
+              <a:ext uri="{FF2B5EF4-FFF2-40B4-BE49-F238E27FC236}">
+                <a16:creationId xmlns:a16="http://schemas.microsoft.com/office/drawing/2014/main" id="{23E7BDB9-9C52-4051-B2C0-9D3114AE33C2}"/>
+              </a:ext>
+            </a:extLst>
+          </p:cNvPr>
+          <p:cNvSpPr>
+            <a:spLocks noGrp="1"/>
+          </p:cNvSpPr>
+          <p:nvPr>
+            <p:ph type="body" sz="quarter" idx="15"/>
+          </p:nvPr>
+        </p:nvSpPr>
+        <p:spPr/>
+        <p:txBody>
+          <a:bodyPr/>
+          <a:lstStyle/>
+          <a:p>
+            <a:r>
+              <a:rPr lang="en-GB" dirty="0"/>
+              <a:t>The </a:t>
+            </a:r>
+            <a:r>
+              <a:rPr lang="en-GB" sz="2000" dirty="0" err="1">
+                <a:latin typeface="Consolas" panose="020B0609020204030204" pitchFamily="49" charset="0"/>
+              </a:rPr>
+              <a:t>MethodReplacer.ReplaceMethod</a:t>
+            </a:r>
+            <a:r>
+              <a:rPr lang="en-GB" dirty="0"/>
+              <a:t> method allows us to replace some methods with our own code.</a:t>
+            </a:r>
+          </a:p>
+          <a:p>
+            <a:r>
+              <a:rPr lang="en-GB" dirty="0"/>
+              <a:t>Once replaced, every call to this method on any instance of an object will call our code.</a:t>
+            </a:r>
+          </a:p>
+          <a:p>
+            <a:r>
+              <a:rPr lang="en-GB" dirty="0"/>
+              <a:t>There are some restrictions:</a:t>
+            </a:r>
+          </a:p>
+          <a:p>
+            <a:pPr lvl="1"/>
+            <a:r>
+              <a:rPr lang="en-GB" dirty="0"/>
+              <a:t>It can’t replace constructors on objects</a:t>
+            </a:r>
+          </a:p>
+          <a:p>
+            <a:pPr lvl="1"/>
+            <a:r>
+              <a:rPr lang="en-GB" dirty="0"/>
+              <a:t>It can’t replace methods on Form objects</a:t>
+            </a:r>
+          </a:p>
+          <a:p>
+            <a:pPr lvl="1"/>
+            <a:r>
+              <a:rPr lang="en-GB" dirty="0"/>
+              <a:t>It can’t replace methods in the same class that they’re called from</a:t>
+            </a:r>
+          </a:p>
+          <a:p>
+            <a:pPr lvl="1"/>
+            <a:r>
+              <a:rPr lang="en-GB" dirty="0"/>
+              <a:t>Once a method has been replaced it can’t be replaced again or reinstated</a:t>
+            </a:r>
+          </a:p>
+          <a:p>
+            <a:r>
+              <a:rPr lang="en-GB" dirty="0"/>
+              <a:t>This function is powerful but could also lead to complicated setup if used too much.</a:t>
+            </a:r>
+          </a:p>
+          <a:p>
+            <a:r>
+              <a:rPr lang="en-GB" dirty="0"/>
+              <a:t>Only use when you absolutely have to!</a:t>
+            </a:r>
+          </a:p>
+        </p:txBody>
+      </p:sp>
+    </p:spTree>
+    <p:extLst>
+      <p:ext uri="{BB962C8B-B14F-4D97-AF65-F5344CB8AC3E}">
+        <p14:creationId xmlns:p14="http://schemas.microsoft.com/office/powerpoint/2010/main" val="756183182"/>
+      </p:ext>
+    </p:extLst>
+  </p:cSld>
+  <p:clrMapOvr>
+    <a:masterClrMapping/>
+  </p:clrMapOvr>
+</p:sld>
+</file>
+
+<file path=ppt/slides/slide14.xml><?xml version="1.0" encoding="utf-8"?>
+<p:sld xmlns:a="http://schemas.openxmlformats.org/drawingml/2006/main" xmlns:r="http://schemas.openxmlformats.org/officeDocument/2006/relationships" xmlns:p="http://schemas.openxmlformats.org/presentationml/2006/main">
+  <p:cSld>
+    <p:spTree>
+      <p:nvGrpSpPr>
+        <p:cNvPr id="1" name=""/>
+        <p:cNvGrpSpPr/>
+        <p:nvPr/>
+      </p:nvGrpSpPr>
+      <p:grpSpPr>
+        <a:xfrm>
+          <a:off x="0" y="0"/>
+          <a:ext cx="0" cy="0"/>
+          <a:chOff x="0" y="0"/>
+          <a:chExt cx="0" cy="0"/>
+        </a:xfrm>
+      </p:grpSpPr>
+      <p:sp>
+        <p:nvSpPr>
+          <p:cNvPr id="2" name="Slide Number Placeholder 1">
+            <a:extLst>
+              <a:ext uri="{FF2B5EF4-FFF2-40B4-BE49-F238E27FC236}">
                 <a16:creationId xmlns:a16="http://schemas.microsoft.com/office/drawing/2014/main" id="{BE848088-BF29-4DAA-8518-BC5886B3F1DD}"/>
               </a:ext>
             </a:extLst>
@@ -5568,7 +6258,7 @@
             <a:fld id="{F3027E8A-8089-874A-B94B-79D229332FD1}" type="slidenum">
               <a:rPr lang="en-US" smtClean="0"/>
               <a:pPr/>
-              <a:t>13</a:t>
+              <a:t>14</a:t>
             </a:fld>
             <a:endParaRPr lang="en-US" dirty="0"/>
           </a:p>
@@ -6143,7 +6833,7 @@
 </p:sld>
 </file>
 
-<file path=ppt/slides/slide14.xml><?xml version="1.0" encoding="utf-8"?>
+<file path=ppt/slides/slide15.xml><?xml version="1.0" encoding="utf-8"?>
 <p:sld xmlns:a="http://schemas.openxmlformats.org/drawingml/2006/main" xmlns:r="http://schemas.openxmlformats.org/officeDocument/2006/relationships" xmlns:p="http://schemas.openxmlformats.org/presentationml/2006/main">
   <p:cSld>
     <p:spTree>
@@ -6184,7 +6874,7 @@
             <a:fld id="{F3027E8A-8089-874A-B94B-79D229332FD1}" type="slidenum">
               <a:rPr lang="en-US" smtClean="0"/>
               <a:pPr/>
-              <a:t>14</a:t>
+              <a:t>15</a:t>
             </a:fld>
             <a:endParaRPr lang="en-US" dirty="0"/>
           </a:p>
@@ -6879,7 +7569,7 @@
 </p:sld>
 </file>
 
-<file path=ppt/slides/slide15.xml><?xml version="1.0" encoding="utf-8"?>
+<file path=ppt/slides/slide16.xml><?xml version="1.0" encoding="utf-8"?>
 <p:sld xmlns:a="http://schemas.openxmlformats.org/drawingml/2006/main" xmlns:r="http://schemas.openxmlformats.org/officeDocument/2006/relationships" xmlns:p="http://schemas.openxmlformats.org/presentationml/2006/main">
   <p:cSld>
     <p:spTree>
@@ -6920,7 +7610,7 @@
             <a:fld id="{F3027E8A-8089-874A-B94B-79D229332FD1}" type="slidenum">
               <a:rPr lang="en-US" smtClean="0"/>
               <a:pPr/>
-              <a:t>15</a:t>
+              <a:t>16</a:t>
             </a:fld>
             <a:endParaRPr lang="en-US" dirty="0"/>
           </a:p>
@@ -7548,153 +8238,6 @@
 </p:sld>
 </file>
 
-<file path=ppt/slides/slide16.xml><?xml version="1.0" encoding="utf-8"?>
-<p:sld xmlns:a="http://schemas.openxmlformats.org/drawingml/2006/main" xmlns:r="http://schemas.openxmlformats.org/officeDocument/2006/relationships" xmlns:p="http://schemas.openxmlformats.org/presentationml/2006/main">
-  <p:cSld>
-    <p:spTree>
-      <p:nvGrpSpPr>
-        <p:cNvPr id="1" name=""/>
-        <p:cNvGrpSpPr/>
-        <p:nvPr/>
-      </p:nvGrpSpPr>
-      <p:grpSpPr>
-        <a:xfrm>
-          <a:off x="0" y="0"/>
-          <a:ext cx="0" cy="0"/>
-          <a:chOff x="0" y="0"/>
-          <a:chExt cx="0" cy="0"/>
-        </a:xfrm>
-      </p:grpSpPr>
-      <p:sp>
-        <p:nvSpPr>
-          <p:cNvPr id="2" name="Slide Number Placeholder 1">
-            <a:extLst>
-              <a:ext uri="{FF2B5EF4-FFF2-40B4-BE49-F238E27FC236}">
-                <a16:creationId xmlns:a16="http://schemas.microsoft.com/office/drawing/2014/main" id="{5C281B32-95EA-4594-B84A-6BC9AB6AD7EC}"/>
-              </a:ext>
-            </a:extLst>
-          </p:cNvPr>
-          <p:cNvSpPr>
-            <a:spLocks noGrp="1"/>
-          </p:cNvSpPr>
-          <p:nvPr>
-            <p:ph type="sldNum" sz="quarter" idx="14"/>
-          </p:nvPr>
-        </p:nvSpPr>
-        <p:spPr/>
-        <p:txBody>
-          <a:bodyPr/>
-          <a:lstStyle/>
-          <a:p>
-            <a:fld id="{F3027E8A-8089-874A-B94B-79D229332FD1}" type="slidenum">
-              <a:rPr lang="en-US" smtClean="0"/>
-              <a:pPr/>
-              <a:t>16</a:t>
-            </a:fld>
-            <a:endParaRPr lang="en-US" dirty="0"/>
-          </a:p>
-        </p:txBody>
-      </p:sp>
-      <p:sp>
-        <p:nvSpPr>
-          <p:cNvPr id="3" name="Title 2">
-            <a:extLst>
-              <a:ext uri="{FF2B5EF4-FFF2-40B4-BE49-F238E27FC236}">
-                <a16:creationId xmlns:a16="http://schemas.microsoft.com/office/drawing/2014/main" id="{BDC71383-C993-4E62-9CA1-D7947A9915AE}"/>
-              </a:ext>
-            </a:extLst>
-          </p:cNvPr>
-          <p:cNvSpPr>
-            <a:spLocks noGrp="1"/>
-          </p:cNvSpPr>
-          <p:nvPr>
-            <p:ph type="title"/>
-          </p:nvPr>
-        </p:nvSpPr>
-        <p:spPr/>
-        <p:txBody>
-          <a:bodyPr/>
-          <a:lstStyle/>
-          <a:p>
-            <a:r>
-              <a:rPr lang="en-GB" dirty="0"/>
-              <a:t>IMPORTANT</a:t>
-            </a:r>
-          </a:p>
-        </p:txBody>
-      </p:sp>
-      <p:sp>
-        <p:nvSpPr>
-          <p:cNvPr id="4" name="Text Placeholder 3">
-            <a:extLst>
-              <a:ext uri="{FF2B5EF4-FFF2-40B4-BE49-F238E27FC236}">
-                <a16:creationId xmlns:a16="http://schemas.microsoft.com/office/drawing/2014/main" id="{EF68829C-0638-4367-A6BB-DA895216CC05}"/>
-              </a:ext>
-            </a:extLst>
-          </p:cNvPr>
-          <p:cNvSpPr>
-            <a:spLocks noGrp="1"/>
-          </p:cNvSpPr>
-          <p:nvPr>
-            <p:ph type="body" sz="quarter" idx="15"/>
-          </p:nvPr>
-        </p:nvSpPr>
-        <p:spPr>
-          <a:xfrm>
-            <a:off x="593724" y="2608583"/>
-            <a:ext cx="11001375" cy="1640834"/>
-          </a:xfrm>
-        </p:spPr>
-        <p:txBody>
-          <a:bodyPr/>
-          <a:lstStyle/>
-          <a:p>
-            <a:pPr marL="0" indent="0" algn="ctr">
-              <a:buNone/>
-            </a:pPr>
-            <a:r>
-              <a:rPr lang="en-GB" dirty="0"/>
-              <a:t>These tests are </a:t>
-            </a:r>
-            <a:r>
-              <a:rPr lang="en-GB" b="1" dirty="0"/>
-              <a:t>not</a:t>
-            </a:r>
-            <a:r>
-              <a:rPr lang="en-GB" dirty="0"/>
-              <a:t> meant to be the final, lasting tests</a:t>
-            </a:r>
-          </a:p>
-          <a:p>
-            <a:pPr marL="0" indent="0" algn="ctr">
-              <a:buNone/>
-            </a:pPr>
-            <a:endParaRPr lang="en-GB" dirty="0"/>
-          </a:p>
-          <a:p>
-            <a:pPr marL="0" indent="0" algn="ctr">
-              <a:buNone/>
-            </a:pPr>
-            <a:r>
-              <a:rPr lang="en-GB" dirty="0"/>
-              <a:t>They are a scaffold to allow the refactoring of the code to use proper testing patterns</a:t>
-            </a:r>
-          </a:p>
-        </p:txBody>
-      </p:sp>
-    </p:spTree>
-    <p:extLst>
-      <p:ext uri="{BB962C8B-B14F-4D97-AF65-F5344CB8AC3E}">
-        <p14:creationId xmlns:p14="http://schemas.microsoft.com/office/powerpoint/2010/main" val="169290967"/>
-      </p:ext>
-    </p:extLst>
-  </p:cSld>
-  <p:clrMapOvr>
-    <a:masterClrMapping/>
-  </p:clrMapOvr>
-</p:sld>
-</file>
-
 <file path=ppt/slides/slide17.xml><?xml version="1.0" encoding="utf-8"?>
 <p:sld xmlns:a="http://schemas.openxmlformats.org/drawingml/2006/main" xmlns:r="http://schemas.openxmlformats.org/officeDocument/2006/relationships" xmlns:p="http://schemas.openxmlformats.org/presentationml/2006/main">
   <p:cSld>
@@ -7717,7 +8260,7 @@
           <p:cNvPr id="2" name="Slide Number Placeholder 1">
             <a:extLst>
               <a:ext uri="{FF2B5EF4-FFF2-40B4-BE49-F238E27FC236}">
-                <a16:creationId xmlns:a16="http://schemas.microsoft.com/office/drawing/2014/main" id="{FFA85AE8-A8A4-48CD-94AE-586FB0A9DF1D}"/>
+                <a16:creationId xmlns:a16="http://schemas.microsoft.com/office/drawing/2014/main" id="{5C281B32-95EA-4594-B84A-6BC9AB6AD7EC}"/>
               </a:ext>
             </a:extLst>
           </p:cNvPr>
@@ -7747,7 +8290,7 @@
           <p:cNvPr id="3" name="Title 2">
             <a:extLst>
               <a:ext uri="{FF2B5EF4-FFF2-40B4-BE49-F238E27FC236}">
-                <a16:creationId xmlns:a16="http://schemas.microsoft.com/office/drawing/2014/main" id="{F70A228B-038D-4DCA-9D1B-1038F273F392}"/>
+                <a16:creationId xmlns:a16="http://schemas.microsoft.com/office/drawing/2014/main" id="{BDC71383-C993-4E62-9CA1-D7947A9915AE}"/>
               </a:ext>
             </a:extLst>
           </p:cNvPr>
@@ -7763,7 +8306,10 @@
           <a:bodyPr/>
           <a:lstStyle/>
           <a:p>
-            <a:endParaRPr lang="en-GB"/>
+            <a:r>
+              <a:rPr lang="en-GB" dirty="0"/>
+              <a:t>IMPORTANT</a:t>
+            </a:r>
           </a:p>
         </p:txBody>
       </p:sp>
@@ -7772,7 +8318,7 @@
           <p:cNvPr id="4" name="Text Placeholder 3">
             <a:extLst>
               <a:ext uri="{FF2B5EF4-FFF2-40B4-BE49-F238E27FC236}">
-                <a16:creationId xmlns:a16="http://schemas.microsoft.com/office/drawing/2014/main" id="{36417D58-5AD2-40BA-9AEA-F434C22C4981}"/>
+                <a16:creationId xmlns:a16="http://schemas.microsoft.com/office/drawing/2014/main" id="{EF68829C-0638-4367-A6BB-DA895216CC05}"/>
               </a:ext>
             </a:extLst>
           </p:cNvPr>
@@ -7783,7 +8329,12 @@
             <p:ph type="body" sz="quarter" idx="15"/>
           </p:nvPr>
         </p:nvSpPr>
-        <p:spPr/>
+        <p:spPr>
+          <a:xfrm>
+            <a:off x="593724" y="2608583"/>
+            <a:ext cx="11001375" cy="1640834"/>
+          </a:xfrm>
+        </p:spPr>
         <p:txBody>
           <a:bodyPr/>
           <a:lstStyle/>
@@ -7792,8 +8343,31 @@
               <a:buNone/>
             </a:pPr>
             <a:r>
-              <a:rPr lang="en-GB" sz="4000" dirty="0"/>
-              <a:t>Questions?</a:t>
+              <a:rPr lang="en-GB" dirty="0"/>
+              <a:t>These tests are </a:t>
+            </a:r>
+            <a:r>
+              <a:rPr lang="en-GB" b="1" dirty="0"/>
+              <a:t>not</a:t>
+            </a:r>
+            <a:r>
+              <a:rPr lang="en-GB" dirty="0"/>
+              <a:t> meant to be the final, lasting tests</a:t>
+            </a:r>
+          </a:p>
+          <a:p>
+            <a:pPr marL="0" indent="0" algn="ctr">
+              <a:buNone/>
+            </a:pPr>
+            <a:endParaRPr lang="en-GB" dirty="0"/>
+          </a:p>
+          <a:p>
+            <a:pPr marL="0" indent="0" algn="ctr">
+              <a:buNone/>
+            </a:pPr>
+            <a:r>
+              <a:rPr lang="en-GB" dirty="0"/>
+              <a:t>They are a scaffold to allow the refactoring of the code to use proper testing patterns</a:t>
             </a:r>
           </a:p>
         </p:txBody>
@@ -7801,7 +8375,7 @@
     </p:spTree>
     <p:extLst>
       <p:ext uri="{BB962C8B-B14F-4D97-AF65-F5344CB8AC3E}">
-        <p14:creationId xmlns:p14="http://schemas.microsoft.com/office/powerpoint/2010/main" val="3079598091"/>
+        <p14:creationId xmlns:p14="http://schemas.microsoft.com/office/powerpoint/2010/main" val="169290967"/>
       </p:ext>
     </p:extLst>
   </p:cSld>
@@ -7833,6 +8407,122 @@
           <p:cNvPr id="2" name="Slide Number Placeholder 1">
             <a:extLst>
               <a:ext uri="{FF2B5EF4-FFF2-40B4-BE49-F238E27FC236}">
+                <a16:creationId xmlns:a16="http://schemas.microsoft.com/office/drawing/2014/main" id="{FFA85AE8-A8A4-48CD-94AE-586FB0A9DF1D}"/>
+              </a:ext>
+            </a:extLst>
+          </p:cNvPr>
+          <p:cNvSpPr>
+            <a:spLocks noGrp="1"/>
+          </p:cNvSpPr>
+          <p:nvPr>
+            <p:ph type="sldNum" sz="quarter" idx="14"/>
+          </p:nvPr>
+        </p:nvSpPr>
+        <p:spPr/>
+        <p:txBody>
+          <a:bodyPr/>
+          <a:lstStyle/>
+          <a:p>
+            <a:fld id="{F3027E8A-8089-874A-B94B-79D229332FD1}" type="slidenum">
+              <a:rPr lang="en-US" smtClean="0"/>
+              <a:pPr/>
+              <a:t>18</a:t>
+            </a:fld>
+            <a:endParaRPr lang="en-US" dirty="0"/>
+          </a:p>
+        </p:txBody>
+      </p:sp>
+      <p:sp>
+        <p:nvSpPr>
+          <p:cNvPr id="3" name="Title 2">
+            <a:extLst>
+              <a:ext uri="{FF2B5EF4-FFF2-40B4-BE49-F238E27FC236}">
+                <a16:creationId xmlns:a16="http://schemas.microsoft.com/office/drawing/2014/main" id="{F70A228B-038D-4DCA-9D1B-1038F273F392}"/>
+              </a:ext>
+            </a:extLst>
+          </p:cNvPr>
+          <p:cNvSpPr>
+            <a:spLocks noGrp="1"/>
+          </p:cNvSpPr>
+          <p:nvPr>
+            <p:ph type="title"/>
+          </p:nvPr>
+        </p:nvSpPr>
+        <p:spPr/>
+        <p:txBody>
+          <a:bodyPr/>
+          <a:lstStyle/>
+          <a:p>
+            <a:endParaRPr lang="en-GB"/>
+          </a:p>
+        </p:txBody>
+      </p:sp>
+      <p:sp>
+        <p:nvSpPr>
+          <p:cNvPr id="4" name="Text Placeholder 3">
+            <a:extLst>
+              <a:ext uri="{FF2B5EF4-FFF2-40B4-BE49-F238E27FC236}">
+                <a16:creationId xmlns:a16="http://schemas.microsoft.com/office/drawing/2014/main" id="{36417D58-5AD2-40BA-9AEA-F434C22C4981}"/>
+              </a:ext>
+            </a:extLst>
+          </p:cNvPr>
+          <p:cNvSpPr>
+            <a:spLocks noGrp="1"/>
+          </p:cNvSpPr>
+          <p:nvPr>
+            <p:ph type="body" sz="quarter" idx="15"/>
+          </p:nvPr>
+        </p:nvSpPr>
+        <p:spPr/>
+        <p:txBody>
+          <a:bodyPr/>
+          <a:lstStyle/>
+          <a:p>
+            <a:pPr marL="0" indent="0" algn="ctr">
+              <a:buNone/>
+            </a:pPr>
+            <a:r>
+              <a:rPr lang="en-GB" sz="4000" dirty="0"/>
+              <a:t>Questions?</a:t>
+            </a:r>
+          </a:p>
+        </p:txBody>
+      </p:sp>
+    </p:spTree>
+    <p:extLst>
+      <p:ext uri="{BB962C8B-B14F-4D97-AF65-F5344CB8AC3E}">
+        <p14:creationId xmlns:p14="http://schemas.microsoft.com/office/powerpoint/2010/main" val="3079598091"/>
+      </p:ext>
+    </p:extLst>
+  </p:cSld>
+  <p:clrMapOvr>
+    <a:masterClrMapping/>
+  </p:clrMapOvr>
+</p:sld>
+</file>
+
+<file path=ppt/slides/slide19.xml><?xml version="1.0" encoding="utf-8"?>
+<p:sld xmlns:a="http://schemas.openxmlformats.org/drawingml/2006/main" xmlns:r="http://schemas.openxmlformats.org/officeDocument/2006/relationships" xmlns:p="http://schemas.openxmlformats.org/presentationml/2006/main">
+  <p:cSld>
+    <p:spTree>
+      <p:nvGrpSpPr>
+        <p:cNvPr id="1" name=""/>
+        <p:cNvGrpSpPr/>
+        <p:nvPr/>
+      </p:nvGrpSpPr>
+      <p:grpSpPr>
+        <a:xfrm>
+          <a:off x="0" y="0"/>
+          <a:ext cx="0" cy="0"/>
+          <a:chOff x="0" y="0"/>
+          <a:chExt cx="0" cy="0"/>
+        </a:xfrm>
+      </p:grpSpPr>
+      <p:sp>
+        <p:nvSpPr>
+          <p:cNvPr id="2" name="Slide Number Placeholder 1">
+            <a:extLst>
+              <a:ext uri="{FF2B5EF4-FFF2-40B4-BE49-F238E27FC236}">
                 <a16:creationId xmlns:a16="http://schemas.microsoft.com/office/drawing/2014/main" id="{468D377B-A7DB-4015-9B9E-2C11D0148E0B}"/>
               </a:ext>
             </a:extLst>
@@ -7852,7 +8542,7 @@
             <a:fld id="{F3027E8A-8089-874A-B94B-79D229332FD1}" type="slidenum">
               <a:rPr lang="en-US" smtClean="0"/>
               <a:pPr/>
-              <a:t>18</a:t>
+              <a:t>19</a:t>
             </a:fld>
             <a:endParaRPr lang="en-US" dirty="0"/>
           </a:p>
@@ -8604,6 +9294,26 @@
           <a:p>
             <a:r>
               <a:rPr lang="en-GB" dirty="0"/>
+              <a:t>Override methods</a:t>
+            </a:r>
+          </a:p>
+          <a:p>
+            <a:pPr lvl="1"/>
+            <a:r>
+              <a:rPr lang="en-GB" dirty="0"/>
+              <a:t>Allows us to replace methods in classes which can be inherited</a:t>
+            </a:r>
+          </a:p>
+          <a:p>
+            <a:pPr lvl="1"/>
+            <a:r>
+              <a:rPr lang="en-GB" dirty="0"/>
+              <a:t>Often requires changing the code of the called classes and potentially exposes things which should remain internal</a:t>
+            </a:r>
+          </a:p>
+          <a:p>
+            <a:r>
+              <a:rPr lang="en-GB" dirty="0"/>
               <a:t>Method replacement</a:t>
             </a:r>
           </a:p>
@@ -8855,7 +9565,7 @@
           <a:p>
             <a:r>
               <a:rPr lang="en-GB" dirty="0" err="1"/>
-              <a:t>ReflecionHelper.SetPrivateField</a:t>
+              <a:t>ReflectionHelper.SetPrivateField</a:t>
             </a:r>
             <a:endParaRPr lang="en-GB" dirty="0"/>
           </a:p>
@@ -10561,15 +11271,6 @@
 </file>
 
 <file path=customXml/item1.xml><?xml version="1.0" encoding="utf-8"?>
-<?mso-contentType ?>
-<FormTemplates xmlns="http://schemas.microsoft.com/sharepoint/v3/contenttype/forms">
-  <Display>DocumentLibraryForm</Display>
-  <Edit>DocumentLibraryForm</Edit>
-  <New>DocumentLibraryForm</New>
-</FormTemplates>
-</file>
-
-<file path=customXml/item2.xml><?xml version="1.0" encoding="utf-8"?>
 <ct:contentTypeSchema xmlns:ct="http://schemas.microsoft.com/office/2006/metadata/contentType" xmlns:ma="http://schemas.microsoft.com/office/2006/metadata/properties/metaAttributes" ct:_="" ma:_="" ma:contentTypeName="Document" ma:contentTypeID="0x010100DE768BC3BD8688418DB479A8ACD78C19" ma:contentTypeVersion="0" ma:contentTypeDescription="Create a new document." ma:contentTypeScope="" ma:versionID="d7af05181fac0636a7496051b1358a58">
   <xsd:schema xmlns:xsd="http://www.w3.org/2001/XMLSchema" xmlns:p="http://schemas.microsoft.com/office/2006/metadata/properties" targetNamespace="http://schemas.microsoft.com/office/2006/metadata/properties" ma:root="true" ma:fieldsID="4aeb20c0e3442673af7ee10786458764">
     <xsd:element name="properties">
@@ -10618,6 +11319,15 @@
 </ct:contentTypeSchema>
 </file>
 
+<file path=customXml/item2.xml><?xml version="1.0" encoding="utf-8"?>
+<?mso-contentType ?>
+<FormTemplates xmlns="http://schemas.microsoft.com/sharepoint/v3/contenttype/forms">
+  <Display>DocumentLibraryForm</Display>
+  <Edit>DocumentLibraryForm</Edit>
+  <New>DocumentLibraryForm</New>
+</FormTemplates>
+</file>
+
 <file path=customXml/item3.xml><?xml version="1.0" encoding="utf-8"?>
 <p:properties xmlns:p="http://schemas.microsoft.com/office/2006/metadata/properties" xmlns:xsi="http://www.w3.org/2001/XMLSchema-instance">
   <documentManagement/>
@@ -10625,14 +11335,6 @@
 </file>
 
 <file path=customXml/itemProps1.xml><?xml version="1.0" encoding="utf-8"?>
-<ds:datastoreItem xmlns:ds="http://schemas.openxmlformats.org/officeDocument/2006/customXml" ds:itemID="{46DAB7DB-F330-44FA-A31F-7DCB2E587471}">
-  <ds:schemaRefs>
-    <ds:schemaRef ds:uri="http://schemas.microsoft.com/sharepoint/v3/contenttype/forms"/>
-  </ds:schemaRefs>
-</ds:datastoreItem>
-</file>
-
-<file path=customXml/itemProps2.xml><?xml version="1.0" encoding="utf-8"?>
 <ds:datastoreItem xmlns:ds="http://schemas.openxmlformats.org/officeDocument/2006/customXml" ds:itemID="{25058BEC-C8AA-4075-9178-F48DBD78029C}">
   <ds:schemaRefs>
     <ds:schemaRef ds:uri="http://schemas.microsoft.com/office/2006/metadata/contentType"/>
@@ -10643,6 +11345,14 @@
     <ds:schemaRef ds:uri="http://purl.org/dc/elements/1.1/"/>
     <ds:schemaRef ds:uri="http://purl.org/dc/terms/"/>
     <ds:schemaRef ds:uri="http://schemas.microsoft.com/office/internal/2005/internalDocumentation"/>
+  </ds:schemaRefs>
+</ds:datastoreItem>
+</file>
+
+<file path=customXml/itemProps2.xml><?xml version="1.0" encoding="utf-8"?>
+<ds:datastoreItem xmlns:ds="http://schemas.openxmlformats.org/officeDocument/2006/customXml" ds:itemID="{46DAB7DB-F330-44FA-A31F-7DCB2E587471}">
+  <ds:schemaRefs>
+    <ds:schemaRef ds:uri="http://schemas.microsoft.com/sharepoint/v3/contenttype/forms"/>
   </ds:schemaRefs>
 </ds:datastoreItem>
 </file>

</xml_diff>